<commit_message>
Zustand KEINE durch Zustand GELB_BLINKEN ersetzt
</commit_message>
<xml_diff>
--- a/SW/13_Zustandsmaschine/Zustandsuebergangsdiagramm.pptx
+++ b/SW/13_Zustandsmaschine/Zustandsuebergangsdiagramm.pptx
@@ -259,7 +259,7 @@
           <a:p>
             <a:fld id="{29D93379-B5B7-4114-BC01-E7C239F6C97C}" type="datetimeFigureOut">
               <a:rPr lang="de-DE" smtClean="0"/>
-              <a:t>01.12.2022</a:t>
+              <a:t>04.12.2022</a:t>
             </a:fld>
             <a:endParaRPr lang="de-DE"/>
           </a:p>
@@ -457,7 +457,7 @@
           <a:p>
             <a:fld id="{29D93379-B5B7-4114-BC01-E7C239F6C97C}" type="datetimeFigureOut">
               <a:rPr lang="de-DE" smtClean="0"/>
-              <a:t>01.12.2022</a:t>
+              <a:t>04.12.2022</a:t>
             </a:fld>
             <a:endParaRPr lang="de-DE"/>
           </a:p>
@@ -665,7 +665,7 @@
           <a:p>
             <a:fld id="{29D93379-B5B7-4114-BC01-E7C239F6C97C}" type="datetimeFigureOut">
               <a:rPr lang="de-DE" smtClean="0"/>
-              <a:t>01.12.2022</a:t>
+              <a:t>04.12.2022</a:t>
             </a:fld>
             <a:endParaRPr lang="de-DE"/>
           </a:p>
@@ -863,7 +863,7 @@
           <a:p>
             <a:fld id="{29D93379-B5B7-4114-BC01-E7C239F6C97C}" type="datetimeFigureOut">
               <a:rPr lang="de-DE" smtClean="0"/>
-              <a:t>01.12.2022</a:t>
+              <a:t>04.12.2022</a:t>
             </a:fld>
             <a:endParaRPr lang="de-DE"/>
           </a:p>
@@ -1138,7 +1138,7 @@
           <a:p>
             <a:fld id="{29D93379-B5B7-4114-BC01-E7C239F6C97C}" type="datetimeFigureOut">
               <a:rPr lang="de-DE" smtClean="0"/>
-              <a:t>01.12.2022</a:t>
+              <a:t>04.12.2022</a:t>
             </a:fld>
             <a:endParaRPr lang="de-DE"/>
           </a:p>
@@ -1403,7 +1403,7 @@
           <a:p>
             <a:fld id="{29D93379-B5B7-4114-BC01-E7C239F6C97C}" type="datetimeFigureOut">
               <a:rPr lang="de-DE" smtClean="0"/>
-              <a:t>01.12.2022</a:t>
+              <a:t>04.12.2022</a:t>
             </a:fld>
             <a:endParaRPr lang="de-DE"/>
           </a:p>
@@ -1815,7 +1815,7 @@
           <a:p>
             <a:fld id="{29D93379-B5B7-4114-BC01-E7C239F6C97C}" type="datetimeFigureOut">
               <a:rPr lang="de-DE" smtClean="0"/>
-              <a:t>01.12.2022</a:t>
+              <a:t>04.12.2022</a:t>
             </a:fld>
             <a:endParaRPr lang="de-DE"/>
           </a:p>
@@ -1956,7 +1956,7 @@
           <a:p>
             <a:fld id="{29D93379-B5B7-4114-BC01-E7C239F6C97C}" type="datetimeFigureOut">
               <a:rPr lang="de-DE" smtClean="0"/>
-              <a:t>01.12.2022</a:t>
+              <a:t>04.12.2022</a:t>
             </a:fld>
             <a:endParaRPr lang="de-DE"/>
           </a:p>
@@ -2069,7 +2069,7 @@
           <a:p>
             <a:fld id="{29D93379-B5B7-4114-BC01-E7C239F6C97C}" type="datetimeFigureOut">
               <a:rPr lang="de-DE" smtClean="0"/>
-              <a:t>01.12.2022</a:t>
+              <a:t>04.12.2022</a:t>
             </a:fld>
             <a:endParaRPr lang="de-DE"/>
           </a:p>
@@ -2380,7 +2380,7 @@
           <a:p>
             <a:fld id="{29D93379-B5B7-4114-BC01-E7C239F6C97C}" type="datetimeFigureOut">
               <a:rPr lang="de-DE" smtClean="0"/>
-              <a:t>01.12.2022</a:t>
+              <a:t>04.12.2022</a:t>
             </a:fld>
             <a:endParaRPr lang="de-DE"/>
           </a:p>
@@ -2668,7 +2668,7 @@
           <a:p>
             <a:fld id="{29D93379-B5B7-4114-BC01-E7C239F6C97C}" type="datetimeFigureOut">
               <a:rPr lang="de-DE" smtClean="0"/>
-              <a:t>01.12.2022</a:t>
+              <a:t>04.12.2022</a:t>
             </a:fld>
             <a:endParaRPr lang="de-DE"/>
           </a:p>
@@ -2909,7 +2909,7 @@
           <a:p>
             <a:fld id="{29D93379-B5B7-4114-BC01-E7C239F6C97C}" type="datetimeFigureOut">
               <a:rPr lang="de-DE" smtClean="0"/>
-              <a:t>01.12.2022</a:t>
+              <a:t>04.12.2022</a:t>
             </a:fld>
             <a:endParaRPr lang="de-DE"/>
           </a:p>
@@ -3394,7 +3394,7 @@
               <a:pPr algn="ctr"/>
               <a:r>
                 <a:rPr lang="de-DE" dirty="0"/>
-                <a:t>KEINE</a:t>
+                <a:t>GELB_BLINKEN</a:t>
               </a:r>
             </a:p>
           </p:txBody>

</xml_diff>